<commit_message>
New challenge 06/06/2017 New Pres of Baron and Kenny
</commit_message>
<xml_diff>
--- a/How to submit your results.pptx
+++ b/How to submit your results.pptx
@@ -294,7 +294,7 @@
           <a:p>
             <a:fld id="{29674A7B-7CA5-4BDB-958A-B9E61FBD3DA9}" type="datetimeFigureOut">
               <a:rPr lang="fr-FR" smtClean="0"/>
-              <a:t>05/06/2017</a:t>
+              <a:t>06/06/17</a:t>
             </a:fld>
             <a:endParaRPr lang="fr-FR"/>
           </a:p>
@@ -336,7 +336,7 @@
           <a:p>
             <a:fld id="{4DC58DB7-9ADD-4D5A-AE18-E6557F63B42A}" type="slidenum">
               <a:rPr lang="fr-FR" smtClean="0"/>
-              <a:t>‹N°›</a:t>
+              <a:t>‹#›</a:t>
             </a:fld>
             <a:endParaRPr lang="fr-FR"/>
           </a:p>
@@ -459,7 +459,7 @@
           <a:p>
             <a:fld id="{29674A7B-7CA5-4BDB-958A-B9E61FBD3DA9}" type="datetimeFigureOut">
               <a:rPr lang="fr-FR" smtClean="0"/>
-              <a:t>05/06/2017</a:t>
+              <a:t>06/06/17</a:t>
             </a:fld>
             <a:endParaRPr lang="fr-FR"/>
           </a:p>
@@ -501,7 +501,7 @@
           <a:p>
             <a:fld id="{4DC58DB7-9ADD-4D5A-AE18-E6557F63B42A}" type="slidenum">
               <a:rPr lang="fr-FR" smtClean="0"/>
-              <a:t>‹N°›</a:t>
+              <a:t>‹#›</a:t>
             </a:fld>
             <a:endParaRPr lang="fr-FR"/>
           </a:p>
@@ -634,7 +634,7 @@
           <a:p>
             <a:fld id="{29674A7B-7CA5-4BDB-958A-B9E61FBD3DA9}" type="datetimeFigureOut">
               <a:rPr lang="fr-FR" smtClean="0"/>
-              <a:t>05/06/2017</a:t>
+              <a:t>06/06/17</a:t>
             </a:fld>
             <a:endParaRPr lang="fr-FR"/>
           </a:p>
@@ -676,7 +676,7 @@
           <a:p>
             <a:fld id="{4DC58DB7-9ADD-4D5A-AE18-E6557F63B42A}" type="slidenum">
               <a:rPr lang="fr-FR" smtClean="0"/>
-              <a:t>‹N°›</a:t>
+              <a:t>‹#›</a:t>
             </a:fld>
             <a:endParaRPr lang="fr-FR"/>
           </a:p>
@@ -799,7 +799,7 @@
           <a:p>
             <a:fld id="{29674A7B-7CA5-4BDB-958A-B9E61FBD3DA9}" type="datetimeFigureOut">
               <a:rPr lang="fr-FR" smtClean="0"/>
-              <a:t>05/06/2017</a:t>
+              <a:t>06/06/17</a:t>
             </a:fld>
             <a:endParaRPr lang="fr-FR"/>
           </a:p>
@@ -841,7 +841,7 @@
           <a:p>
             <a:fld id="{4DC58DB7-9ADD-4D5A-AE18-E6557F63B42A}" type="slidenum">
               <a:rPr lang="fr-FR" smtClean="0"/>
-              <a:t>‹N°›</a:t>
+              <a:t>‹#›</a:t>
             </a:fld>
             <a:endParaRPr lang="fr-FR"/>
           </a:p>
@@ -1040,7 +1040,7 @@
           <a:p>
             <a:fld id="{29674A7B-7CA5-4BDB-958A-B9E61FBD3DA9}" type="datetimeFigureOut">
               <a:rPr lang="fr-FR" smtClean="0"/>
-              <a:t>05/06/2017</a:t>
+              <a:t>06/06/17</a:t>
             </a:fld>
             <a:endParaRPr lang="fr-FR"/>
           </a:p>
@@ -1082,7 +1082,7 @@
           <a:p>
             <a:fld id="{4DC58DB7-9ADD-4D5A-AE18-E6557F63B42A}" type="slidenum">
               <a:rPr lang="fr-FR" smtClean="0"/>
-              <a:t>‹N°›</a:t>
+              <a:t>‹#›</a:t>
             </a:fld>
             <a:endParaRPr lang="fr-FR"/>
           </a:p>
@@ -1323,7 +1323,7 @@
           <a:p>
             <a:fld id="{29674A7B-7CA5-4BDB-958A-B9E61FBD3DA9}" type="datetimeFigureOut">
               <a:rPr lang="fr-FR" smtClean="0"/>
-              <a:t>05/06/2017</a:t>
+              <a:t>06/06/17</a:t>
             </a:fld>
             <a:endParaRPr lang="fr-FR"/>
           </a:p>
@@ -1365,7 +1365,7 @@
           <a:p>
             <a:fld id="{4DC58DB7-9ADD-4D5A-AE18-E6557F63B42A}" type="slidenum">
               <a:rPr lang="fr-FR" smtClean="0"/>
-              <a:t>‹N°›</a:t>
+              <a:t>‹#›</a:t>
             </a:fld>
             <a:endParaRPr lang="fr-FR"/>
           </a:p>
@@ -1740,7 +1740,7 @@
           <a:p>
             <a:fld id="{29674A7B-7CA5-4BDB-958A-B9E61FBD3DA9}" type="datetimeFigureOut">
               <a:rPr lang="fr-FR" smtClean="0"/>
-              <a:t>05/06/2017</a:t>
+              <a:t>06/06/17</a:t>
             </a:fld>
             <a:endParaRPr lang="fr-FR"/>
           </a:p>
@@ -1782,7 +1782,7 @@
           <a:p>
             <a:fld id="{4DC58DB7-9ADD-4D5A-AE18-E6557F63B42A}" type="slidenum">
               <a:rPr lang="fr-FR" smtClean="0"/>
-              <a:t>‹N°›</a:t>
+              <a:t>‹#›</a:t>
             </a:fld>
             <a:endParaRPr lang="fr-FR"/>
           </a:p>
@@ -1853,7 +1853,7 @@
           <a:p>
             <a:fld id="{29674A7B-7CA5-4BDB-958A-B9E61FBD3DA9}" type="datetimeFigureOut">
               <a:rPr lang="fr-FR" smtClean="0"/>
-              <a:t>05/06/2017</a:t>
+              <a:t>06/06/17</a:t>
             </a:fld>
             <a:endParaRPr lang="fr-FR"/>
           </a:p>
@@ -1895,7 +1895,7 @@
           <a:p>
             <a:fld id="{4DC58DB7-9ADD-4D5A-AE18-E6557F63B42A}" type="slidenum">
               <a:rPr lang="fr-FR" smtClean="0"/>
-              <a:t>‹N°›</a:t>
+              <a:t>‹#›</a:t>
             </a:fld>
             <a:endParaRPr lang="fr-FR"/>
           </a:p>
@@ -1943,7 +1943,7 @@
           <a:p>
             <a:fld id="{29674A7B-7CA5-4BDB-958A-B9E61FBD3DA9}" type="datetimeFigureOut">
               <a:rPr lang="fr-FR" smtClean="0"/>
-              <a:t>05/06/2017</a:t>
+              <a:t>06/06/17</a:t>
             </a:fld>
             <a:endParaRPr lang="fr-FR"/>
           </a:p>
@@ -1985,7 +1985,7 @@
           <a:p>
             <a:fld id="{4DC58DB7-9ADD-4D5A-AE18-E6557F63B42A}" type="slidenum">
               <a:rPr lang="fr-FR" smtClean="0"/>
-              <a:t>‹N°›</a:t>
+              <a:t>‹#›</a:t>
             </a:fld>
             <a:endParaRPr lang="fr-FR"/>
           </a:p>
@@ -2215,7 +2215,7 @@
           <a:p>
             <a:fld id="{29674A7B-7CA5-4BDB-958A-B9E61FBD3DA9}" type="datetimeFigureOut">
               <a:rPr lang="fr-FR" smtClean="0"/>
-              <a:t>05/06/2017</a:t>
+              <a:t>06/06/17</a:t>
             </a:fld>
             <a:endParaRPr lang="fr-FR"/>
           </a:p>
@@ -2257,7 +2257,7 @@
           <a:p>
             <a:fld id="{4DC58DB7-9ADD-4D5A-AE18-E6557F63B42A}" type="slidenum">
               <a:rPr lang="fr-FR" smtClean="0"/>
-              <a:t>‹N°›</a:t>
+              <a:t>‹#›</a:t>
             </a:fld>
             <a:endParaRPr lang="fr-FR"/>
           </a:p>
@@ -2463,7 +2463,7 @@
           <a:p>
             <a:fld id="{29674A7B-7CA5-4BDB-958A-B9E61FBD3DA9}" type="datetimeFigureOut">
               <a:rPr lang="fr-FR" smtClean="0"/>
-              <a:t>05/06/2017</a:t>
+              <a:t>06/06/17</a:t>
             </a:fld>
             <a:endParaRPr lang="fr-FR"/>
           </a:p>
@@ -2505,7 +2505,7 @@
           <a:p>
             <a:fld id="{4DC58DB7-9ADD-4D5A-AE18-E6557F63B42A}" type="slidenum">
               <a:rPr lang="fr-FR" smtClean="0"/>
-              <a:t>‹N°›</a:t>
+              <a:t>‹#›</a:t>
             </a:fld>
             <a:endParaRPr lang="fr-FR"/>
           </a:p>
@@ -2671,7 +2671,7 @@
           <a:p>
             <a:fld id="{29674A7B-7CA5-4BDB-958A-B9E61FBD3DA9}" type="datetimeFigureOut">
               <a:rPr lang="fr-FR" smtClean="0"/>
-              <a:t>05/06/2017</a:t>
+              <a:t>06/06/17</a:t>
             </a:fld>
             <a:endParaRPr lang="fr-FR"/>
           </a:p>
@@ -2749,7 +2749,7 @@
           <a:p>
             <a:fld id="{4DC58DB7-9ADD-4D5A-AE18-E6557F63B42A}" type="slidenum">
               <a:rPr lang="fr-FR" smtClean="0"/>
-              <a:t>‹N°›</a:t>
+              <a:t>‹#›</a:t>
             </a:fld>
             <a:endParaRPr lang="fr-FR"/>
           </a:p>
@@ -3321,6 +3321,13 @@
   <p:clrMapOvr>
     <a:masterClrMapping/>
   </p:clrMapOvr>
+  <p:timing>
+    <p:tnLst>
+      <p:par>
+        <p:cTn xmlns:p14="http://schemas.microsoft.com/office/powerpoint/2010/main" id="1" dur="indefinite" restart="never" nodeType="tmRoot"/>
+      </p:par>
+    </p:tnLst>
+  </p:timing>
 </p:sld>
 </file>
 
@@ -3402,32 +3409,6 @@
           </a:p>
           <a:p>
             <a:r>
-              <a:rPr lang="fr-FR" dirty="0" err="1" smtClean="0"/>
-              <a:t>Find</a:t>
-            </a:r>
-            <a:r>
-              <a:rPr lang="fr-FR" dirty="0" smtClean="0"/>
-              <a:t> a </a:t>
-            </a:r>
-            <a:r>
-              <a:rPr lang="fr-FR" dirty="0" err="1" smtClean="0"/>
-              <a:t>name</a:t>
-            </a:r>
-            <a:r>
-              <a:rPr lang="fr-FR" dirty="0" smtClean="0"/>
-              <a:t> for </a:t>
-            </a:r>
-            <a:r>
-              <a:rPr lang="fr-FR" dirty="0" err="1" smtClean="0"/>
-              <a:t>your</a:t>
-            </a:r>
-            <a:r>
-              <a:rPr lang="fr-FR" dirty="0" smtClean="0"/>
-              <a:t> team</a:t>
-            </a:r>
-          </a:p>
-          <a:p>
-            <a:r>
               <a:rPr lang="fr-FR" dirty="0" smtClean="0"/>
               <a:t>Email </a:t>
             </a:r>
@@ -3440,39 +3421,53 @@
           <a:p>
             <a:pPr lvl="1"/>
             <a:r>
-              <a:rPr lang="fr-FR" dirty="0" smtClean="0"/>
+              <a:rPr lang="fr-FR" sz="2400" dirty="0" smtClean="0"/>
               <a:t>The </a:t>
             </a:r>
             <a:r>
-              <a:rPr lang="fr-FR" dirty="0" err="1" smtClean="0"/>
+              <a:rPr lang="fr-FR" sz="2400" dirty="0" err="1" smtClean="0"/>
               <a:t>name</a:t>
             </a:r>
             <a:r>
-              <a:rPr lang="fr-FR" dirty="0" smtClean="0"/>
+              <a:rPr lang="fr-FR" sz="2400" dirty="0" smtClean="0"/>
               <a:t> of </a:t>
             </a:r>
             <a:r>
-              <a:rPr lang="fr-FR" dirty="0" err="1" smtClean="0"/>
+              <a:rPr lang="fr-FR" sz="2400" dirty="0" err="1" smtClean="0"/>
               <a:t>your</a:t>
             </a:r>
             <a:r>
-              <a:rPr lang="fr-FR" dirty="0" smtClean="0"/>
+              <a:rPr lang="fr-FR" sz="2400" dirty="0" smtClean="0"/>
               <a:t> team</a:t>
             </a:r>
           </a:p>
           <a:p>
             <a:pPr lvl="1"/>
             <a:r>
-              <a:rPr lang="fr-FR" dirty="0" smtClean="0"/>
+              <a:rPr lang="fr-FR" sz="2400" dirty="0" smtClean="0"/>
               <a:t>The </a:t>
             </a:r>
             <a:r>
-              <a:rPr lang="fr-FR" dirty="0" err="1" smtClean="0"/>
+              <a:rPr lang="fr-FR" sz="2400" dirty="0" err="1" smtClean="0"/>
               <a:t>names</a:t>
             </a:r>
             <a:r>
-              <a:rPr lang="fr-FR" dirty="0" smtClean="0"/>
-              <a:t> of the people in the team</a:t>
+              <a:rPr lang="fr-FR" sz="2400" dirty="0" smtClean="0"/>
+              <a:t> of the people </a:t>
+            </a:r>
+            <a:endParaRPr lang="fr-FR" sz="2400" dirty="0" smtClean="0"/>
+          </a:p>
+          <a:p>
+            <a:pPr marL="457200" lvl="1" indent="0">
+              <a:buNone/>
+            </a:pPr>
+            <a:r>
+              <a:rPr lang="fr-FR" sz="2400" dirty="0" smtClean="0"/>
+              <a:t>in </a:t>
+            </a:r>
+            <a:r>
+              <a:rPr lang="fr-FR" sz="2400" dirty="0" smtClean="0"/>
+              <a:t>the team</a:t>
             </a:r>
           </a:p>
           <a:p>
@@ -3579,23 +3574,28 @@
       </p:pic>
       <p:pic>
         <p:nvPicPr>
-          <p:cNvPr id="2051" name="Picture 3" descr="C:\Users\Florian\Desktop\shinyapp.png"/>
+          <p:cNvPr id="2051" name="Picture 3"/>
           <p:cNvPicPr>
             <a:picLocks noChangeAspect="1" noChangeArrowheads="1"/>
           </p:cNvPicPr>
           <p:nvPr/>
         </p:nvPicPr>
         <p:blipFill>
-          <a:blip r:embed="rId3" cstate="print"/>
-          <a:srcRect/>
+          <a:blip r:embed="rId3">
+            <a:extLst>
+              <a:ext uri="{28A0092B-C50C-407E-A947-70E740481C1C}">
+                <a14:useLocalDpi xmlns:a14="http://schemas.microsoft.com/office/drawing/2010/main" val="0"/>
+              </a:ext>
+            </a:extLst>
+          </a:blip>
           <a:stretch>
             <a:fillRect/>
           </a:stretch>
         </p:blipFill>
         <p:spPr bwMode="auto">
           <a:xfrm>
-            <a:off x="4932040" y="2708920"/>
-            <a:ext cx="3744416" cy="1227474"/>
+            <a:off x="4499992" y="2204864"/>
+            <a:ext cx="4469384" cy="1929003"/>
           </a:xfrm>
           <a:prstGeom prst="rect">
             <a:avLst/>
@@ -3608,6 +3608,13 @@
   <p:clrMapOvr>
     <a:masterClrMapping/>
   </p:clrMapOvr>
+  <p:timing>
+    <p:tnLst>
+      <p:par>
+        <p:cTn xmlns:p14="http://schemas.microsoft.com/office/powerpoint/2010/main" id="1" dur="indefinite" restart="never" nodeType="tmRoot"/>
+      </p:par>
+    </p:tnLst>
+  </p:timing>
 </p:sld>
 </file>
 
@@ -3897,6 +3904,13 @@
   <p:clrMapOvr>
     <a:masterClrMapping/>
   </p:clrMapOvr>
+  <p:timing>
+    <p:tnLst>
+      <p:par>
+        <p:cTn xmlns:p14="http://schemas.microsoft.com/office/powerpoint/2010/main" id="1" dur="indefinite" restart="never" nodeType="tmRoot"/>
+      </p:par>
+    </p:tnLst>
+  </p:timing>
 </p:sld>
 </file>
 

</xml_diff>